<commit_message>
task(2): updated presentation #2
</commit_message>
<xml_diff>
--- a/tasks/task2/task2_presentation.pptx
+++ b/tasks/task2/task2_presentation.pptx
@@ -2694,7 +2694,7 @@
                 </a:solidFill>
                 <a:latin typeface="+mj-lt"/>
               </a:rPr>
-              <a:t>Team 3 - Gründlinger Diana, Targa Aaron, Klotz Thomas, Huber Marcel, Thalmann Matthias</a:t>
+              <a:t>Team 3 - Gründlinger Diana, Huber Marcel, Klotz Thomas, Targa Aaron, Thalmann Matthias</a:t>
             </a:r>
           </a:p>
         </p:txBody>
@@ -2936,7 +2936,7 @@
             </a:br>
             <a:r>
               <a:rPr lang="en-US" dirty="0"/>
-              <a:t>Gründlinger Diana, Targa Aaron, Klotz Thomas, Huber Marcel, Thalmann Matthias</a:t>
+              <a:t>Gründlinger Diana, Huber Marcel, Klotz Thomas, Targa Aaron, Thalmann Matthias</a:t>
             </a:r>
           </a:p>
         </p:txBody>
@@ -4086,17 +4086,16 @@
           <a:lstStyle/>
           <a:p>
             <a:r>
-              <a:rPr lang="de-DE" b="1"/>
+              <a:rPr lang="de-DE" b="1" dirty="0"/>
               <a:t>Team 3</a:t>
             </a:r>
             <a:br>
-              <a:rPr lang="de-DE"/>
+              <a:rPr lang="de-DE" dirty="0"/>
             </a:br>
             <a:r>
-              <a:rPr lang="de-DE"/>
-              <a:t>Gründlinger Diana, Targa Aaron, Klotz Thomas, Huber Marcel, Thalmann Matthias</a:t>
-            </a:r>
-            <a:endParaRPr lang="de-DE" dirty="0"/>
+              <a:rPr lang="de-DE" dirty="0"/>
+              <a:t>Gründlinger Diana, Huber Marcel, Klotz Thomas, Targa Aaron, Thalmann Matthias</a:t>
+            </a:r>
           </a:p>
         </p:txBody>
       </p:sp>
@@ -4768,10 +4767,136 @@
       </p:sp>
       <p:sp>
         <p:nvSpPr>
-          <p:cNvPr id="5" name="Fußzeilenplatzhalter 4">
+          <p:cNvPr id="3" name="Textfeld 2">
             <a:extLst>
               <a:ext uri="{FF2B5EF4-FFF2-40B4-BE49-F238E27FC236}">
-                <a16:creationId xmlns:a16="http://schemas.microsoft.com/office/drawing/2014/main" id="{1DCDA91A-B704-4123-93DB-5942E1A0E406}"/>
+                <a16:creationId xmlns:a16="http://schemas.microsoft.com/office/drawing/2014/main" id="{85C2D6EE-E38B-43EA-95CD-B8C7F5B3124E}"/>
+              </a:ext>
+            </a:extLst>
+          </p:cNvPr>
+          <p:cNvSpPr txBox="1"/>
+          <p:nvPr/>
+        </p:nvSpPr>
+        <p:spPr>
+          <a:xfrm>
+            <a:off x="959496" y="962163"/>
+            <a:ext cx="8808912" cy="4135106"/>
+          </a:xfrm>
+          <a:prstGeom prst="rect">
+            <a:avLst/>
+          </a:prstGeom>
+          <a:noFill/>
+          <a:ln>
+            <a:noFill/>
+          </a:ln>
+        </p:spPr>
+        <p:txBody>
+          <a:bodyPr wrap="square" rtlCol="0">
+            <a:spAutoFit/>
+          </a:bodyPr>
+          <a:lstStyle/>
+          <a:p>
+            <a:pPr marL="285750" indent="-285750">
+              <a:lnSpc>
+                <a:spcPct val="250000"/>
+              </a:lnSpc>
+              <a:buFont typeface="Arial" panose="020B0604020202020204" pitchFamily="34" charset="0"/>
+              <a:buChar char="•"/>
+            </a:pPr>
+            <a:r>
+              <a:rPr lang="en-US" dirty="0"/>
+              <a:t>Type defines the size of the column in bytes</a:t>
+            </a:r>
+          </a:p>
+          <a:p>
+            <a:pPr marL="285750" indent="-285750">
+              <a:lnSpc>
+                <a:spcPct val="250000"/>
+              </a:lnSpc>
+              <a:buFont typeface="Arial" panose="020B0604020202020204" pitchFamily="34" charset="0"/>
+              <a:buChar char="•"/>
+            </a:pPr>
+            <a:r>
+              <a:rPr lang="en-US" dirty="0"/>
+              <a:t>Multiple types of integer (8/16/24/32/48/64 bits)</a:t>
+            </a:r>
+          </a:p>
+          <a:p>
+            <a:pPr marL="742950" lvl="1" indent="-285750">
+              <a:lnSpc>
+                <a:spcPct val="250000"/>
+              </a:lnSpc>
+              <a:buFont typeface="Arial" panose="020B0604020202020204" pitchFamily="34" charset="0"/>
+              <a:buChar char="•"/>
+            </a:pPr>
+            <a:r>
+              <a:rPr lang="en-US" dirty="0"/>
+              <a:t>Big-endian integers </a:t>
+            </a:r>
+            <a:r>
+              <a:rPr lang="en-US" dirty="0">
+                <a:sym typeface="Wingdings" panose="05000000000000000000" pitchFamily="2" charset="2"/>
+              </a:rPr>
+              <a:t> Highest value byte on smallest memory address</a:t>
+            </a:r>
+          </a:p>
+          <a:p>
+            <a:pPr marL="285750" indent="-285750">
+              <a:lnSpc>
+                <a:spcPct val="250000"/>
+              </a:lnSpc>
+              <a:buFont typeface="Arial" panose="020B0604020202020204" pitchFamily="34" charset="0"/>
+              <a:buChar char="•"/>
+            </a:pPr>
+            <a:r>
+              <a:rPr lang="en-US" dirty="0">
+                <a:sym typeface="Wingdings" panose="05000000000000000000" pitchFamily="2" charset="2"/>
+              </a:rPr>
+              <a:t>10/11 are reserved for internal use</a:t>
+            </a:r>
+          </a:p>
+          <a:p>
+            <a:pPr marL="285750" indent="-285750">
+              <a:lnSpc>
+                <a:spcPct val="250000"/>
+              </a:lnSpc>
+              <a:buFont typeface="Arial" panose="020B0604020202020204" pitchFamily="34" charset="0"/>
+              <a:buChar char="•"/>
+            </a:pPr>
+            <a:r>
+              <a:rPr lang="en-US" dirty="0"/>
+              <a:t>Strings are stored without the </a:t>
+            </a:r>
+            <a:r>
+              <a:rPr lang="en-US" i="1" dirty="0" err="1"/>
+              <a:t>nul</a:t>
+            </a:r>
+            <a:r>
+              <a:rPr lang="en-US" dirty="0"/>
+              <a:t> terminator</a:t>
+            </a:r>
+          </a:p>
+          <a:p>
+            <a:pPr marL="285750" indent="-285750">
+              <a:lnSpc>
+                <a:spcPct val="250000"/>
+              </a:lnSpc>
+              <a:buFont typeface="Arial" panose="020B0604020202020204" pitchFamily="34" charset="0"/>
+              <a:buChar char="•"/>
+            </a:pPr>
+            <a:r>
+              <a:rPr lang="en-US" dirty="0"/>
+              <a:t>Columns with a serial type of 0, 8, 9, 12 and 13 have a length of 0 in the body</a:t>
+            </a:r>
+          </a:p>
+        </p:txBody>
+      </p:sp>
+      <p:sp>
+        <p:nvSpPr>
+          <p:cNvPr id="6" name="Fußzeilenplatzhalter 4">
+            <a:extLst>
+              <a:ext uri="{FF2B5EF4-FFF2-40B4-BE49-F238E27FC236}">
+                <a16:creationId xmlns:a16="http://schemas.microsoft.com/office/drawing/2014/main" id="{50000111-B3E5-485C-A4C7-15238D2B8D16}"/>
               </a:ext>
             </a:extLst>
           </p:cNvPr>
@@ -4782,148 +4907,26 @@
             <p:ph type="ftr" sz="quarter" idx="3"/>
           </p:nvPr>
         </p:nvSpPr>
-        <p:spPr/>
+        <p:spPr>
+          <a:xfrm>
+            <a:off x="3719736" y="6356350"/>
+            <a:ext cx="4577680" cy="365125"/>
+          </a:xfrm>
+        </p:spPr>
         <p:txBody>
           <a:bodyPr/>
           <a:lstStyle/>
           <a:p>
             <a:r>
-              <a:rPr lang="de-DE" b="1"/>
+              <a:rPr lang="de-DE" b="1" dirty="0"/>
               <a:t>Team 3</a:t>
             </a:r>
             <a:br>
-              <a:rPr lang="de-DE"/>
+              <a:rPr lang="de-DE" dirty="0"/>
             </a:br>
             <a:r>
-              <a:rPr lang="de-DE"/>
-              <a:t>Gründlinger Diana, Targa Aaron, Klotz Thomas, Huber Marcel, Thalmann Matthias</a:t>
-            </a:r>
-            <a:endParaRPr lang="de-DE" dirty="0"/>
-          </a:p>
-        </p:txBody>
-      </p:sp>
-      <p:sp>
-        <p:nvSpPr>
-          <p:cNvPr id="3" name="Textfeld 2">
-            <a:extLst>
-              <a:ext uri="{FF2B5EF4-FFF2-40B4-BE49-F238E27FC236}">
-                <a16:creationId xmlns:a16="http://schemas.microsoft.com/office/drawing/2014/main" id="{85C2D6EE-E38B-43EA-95CD-B8C7F5B3124E}"/>
-              </a:ext>
-            </a:extLst>
-          </p:cNvPr>
-          <p:cNvSpPr txBox="1"/>
-          <p:nvPr/>
-        </p:nvSpPr>
-        <p:spPr>
-          <a:xfrm>
-            <a:off x="959496" y="962163"/>
-            <a:ext cx="8808912" cy="4135106"/>
-          </a:xfrm>
-          <a:prstGeom prst="rect">
-            <a:avLst/>
-          </a:prstGeom>
-          <a:noFill/>
-          <a:ln>
-            <a:noFill/>
-          </a:ln>
-        </p:spPr>
-        <p:txBody>
-          <a:bodyPr wrap="square" rtlCol="0">
-            <a:spAutoFit/>
-          </a:bodyPr>
-          <a:lstStyle/>
-          <a:p>
-            <a:pPr marL="285750" indent="-285750">
-              <a:lnSpc>
-                <a:spcPct val="250000"/>
-              </a:lnSpc>
-              <a:buFont typeface="Arial" panose="020B0604020202020204" pitchFamily="34" charset="0"/>
-              <a:buChar char="•"/>
-            </a:pPr>
-            <a:r>
-              <a:rPr lang="en-US" dirty="0"/>
-              <a:t>Type defines the size of the column in bytes</a:t>
-            </a:r>
-          </a:p>
-          <a:p>
-            <a:pPr marL="285750" indent="-285750">
-              <a:lnSpc>
-                <a:spcPct val="250000"/>
-              </a:lnSpc>
-              <a:buFont typeface="Arial" panose="020B0604020202020204" pitchFamily="34" charset="0"/>
-              <a:buChar char="•"/>
-            </a:pPr>
-            <a:r>
-              <a:rPr lang="en-US" dirty="0"/>
-              <a:t>Multiple types of integer (8/16/24/32/48/64 bits)</a:t>
-            </a:r>
-          </a:p>
-          <a:p>
-            <a:pPr marL="742950" lvl="1" indent="-285750">
-              <a:lnSpc>
-                <a:spcPct val="250000"/>
-              </a:lnSpc>
-              <a:buFont typeface="Arial" panose="020B0604020202020204" pitchFamily="34" charset="0"/>
-              <a:buChar char="•"/>
-            </a:pPr>
-            <a:r>
-              <a:rPr lang="en-US" dirty="0"/>
-              <a:t>Big-endian integers </a:t>
-            </a:r>
-            <a:r>
-              <a:rPr lang="en-US" dirty="0">
-                <a:sym typeface="Wingdings" panose="05000000000000000000" pitchFamily="2" charset="2"/>
-              </a:rPr>
-              <a:t> Highest value byte on smallest memory address</a:t>
-            </a:r>
-          </a:p>
-          <a:p>
-            <a:pPr marL="285750" indent="-285750">
-              <a:lnSpc>
-                <a:spcPct val="250000"/>
-              </a:lnSpc>
-              <a:buFont typeface="Arial" panose="020B0604020202020204" pitchFamily="34" charset="0"/>
-              <a:buChar char="•"/>
-            </a:pPr>
-            <a:r>
-              <a:rPr lang="en-US" dirty="0">
-                <a:sym typeface="Wingdings" panose="05000000000000000000" pitchFamily="2" charset="2"/>
-              </a:rPr>
-              <a:t>10/11 are reserved for internal use</a:t>
-            </a:r>
-          </a:p>
-          <a:p>
-            <a:pPr marL="285750" indent="-285750">
-              <a:lnSpc>
-                <a:spcPct val="250000"/>
-              </a:lnSpc>
-              <a:buFont typeface="Arial" panose="020B0604020202020204" pitchFamily="34" charset="0"/>
-              <a:buChar char="•"/>
-            </a:pPr>
-            <a:r>
-              <a:rPr lang="en-US" dirty="0"/>
-              <a:t>Strings are stored without the </a:t>
-            </a:r>
-            <a:r>
-              <a:rPr lang="en-US" i="1" dirty="0" err="1"/>
-              <a:t>nul</a:t>
-            </a:r>
-            <a:r>
-              <a:rPr lang="en-US" dirty="0"/>
-              <a:t> terminator</a:t>
-            </a:r>
-          </a:p>
-          <a:p>
-            <a:pPr marL="285750" indent="-285750">
-              <a:lnSpc>
-                <a:spcPct val="250000"/>
-              </a:lnSpc>
-              <a:buFont typeface="Arial" panose="020B0604020202020204" pitchFamily="34" charset="0"/>
-              <a:buChar char="•"/>
-            </a:pPr>
-            <a:r>
-              <a:rPr lang="en-US" dirty="0"/>
-              <a:t>Columns with a serial type of 0, 8, 9, 12 and 13 have a length of 0 in the body</a:t>
+              <a:rPr lang="de-DE" dirty="0"/>
+              <a:t>Gründlinger Diana, Huber Marcel, Klotz Thomas, Targa Aaron, Thalmann Matthias</a:t>
             </a:r>
           </a:p>
         </p:txBody>
@@ -5027,10 +5030,103 @@
       </p:sp>
       <p:sp>
         <p:nvSpPr>
-          <p:cNvPr id="5" name="Fußzeilenplatzhalter 4">
+          <p:cNvPr id="8" name="Textfeld 7">
             <a:extLst>
               <a:ext uri="{FF2B5EF4-FFF2-40B4-BE49-F238E27FC236}">
-                <a16:creationId xmlns:a16="http://schemas.microsoft.com/office/drawing/2014/main" id="{1DCDA91A-B704-4123-93DB-5942E1A0E406}"/>
+                <a16:creationId xmlns:a16="http://schemas.microsoft.com/office/drawing/2014/main" id="{81B17B7E-B1BA-4A53-92CD-D8A61A64A009}"/>
+              </a:ext>
+            </a:extLst>
+          </p:cNvPr>
+          <p:cNvSpPr txBox="1"/>
+          <p:nvPr/>
+        </p:nvSpPr>
+        <p:spPr>
+          <a:xfrm>
+            <a:off x="948880" y="1196752"/>
+            <a:ext cx="8808912" cy="3269485"/>
+          </a:xfrm>
+          <a:prstGeom prst="rect">
+            <a:avLst/>
+          </a:prstGeom>
+          <a:noFill/>
+          <a:ln>
+            <a:noFill/>
+          </a:ln>
+        </p:spPr>
+        <p:txBody>
+          <a:bodyPr wrap="square" rtlCol="0">
+            <a:spAutoFit/>
+          </a:bodyPr>
+          <a:lstStyle/>
+          <a:p>
+            <a:pPr marL="285750" indent="-285750">
+              <a:lnSpc>
+                <a:spcPct val="300000"/>
+              </a:lnSpc>
+              <a:buFont typeface="Arial" panose="020B0604020202020204" pitchFamily="34" charset="0"/>
+              <a:buChar char="•"/>
+            </a:pPr>
+            <a:r>
+              <a:rPr lang="en-US" dirty="0"/>
+              <a:t>64-bit integer</a:t>
+            </a:r>
+          </a:p>
+          <a:p>
+            <a:pPr marL="285750" indent="-285750">
+              <a:lnSpc>
+                <a:spcPct val="300000"/>
+              </a:lnSpc>
+              <a:buFont typeface="Arial" panose="020B0604020202020204" pitchFamily="34" charset="0"/>
+              <a:buChar char="•"/>
+            </a:pPr>
+            <a:r>
+              <a:rPr lang="en-US" dirty="0"/>
+              <a:t>Big endian</a:t>
+            </a:r>
+          </a:p>
+          <a:p>
+            <a:pPr marL="285750" indent="-285750">
+              <a:lnSpc>
+                <a:spcPct val="300000"/>
+              </a:lnSpc>
+              <a:buFont typeface="Arial" panose="020B0604020202020204" pitchFamily="34" charset="0"/>
+              <a:buChar char="•"/>
+            </a:pPr>
+            <a:r>
+              <a:rPr lang="en-US" dirty="0"/>
+              <a:t>Huffman encoded </a:t>
+            </a:r>
+            <a:r>
+              <a:rPr lang="en-US" dirty="0">
+                <a:sym typeface="Wingdings" panose="05000000000000000000" pitchFamily="2" charset="2"/>
+              </a:rPr>
+              <a:t> less bits for small positive values</a:t>
+            </a:r>
+          </a:p>
+          <a:p>
+            <a:pPr marL="285750" indent="-285750">
+              <a:lnSpc>
+                <a:spcPct val="300000"/>
+              </a:lnSpc>
+              <a:buFont typeface="Arial" panose="020B0604020202020204" pitchFamily="34" charset="0"/>
+              <a:buChar char="•"/>
+            </a:pPr>
+            <a:r>
+              <a:rPr lang="en-US" dirty="0">
+                <a:sym typeface="Wingdings" panose="05000000000000000000" pitchFamily="2" charset="2"/>
+              </a:rPr>
+              <a:t>Between 1-9 bytes in length</a:t>
+            </a:r>
+            <a:endParaRPr lang="en-US" dirty="0"/>
+          </a:p>
+        </p:txBody>
+      </p:sp>
+      <p:sp>
+        <p:nvSpPr>
+          <p:cNvPr id="6" name="Fußzeilenplatzhalter 4">
+            <a:extLst>
+              <a:ext uri="{FF2B5EF4-FFF2-40B4-BE49-F238E27FC236}">
+                <a16:creationId xmlns:a16="http://schemas.microsoft.com/office/drawing/2014/main" id="{4BC5E3E6-D542-4DFC-B054-336068C6C02A}"/>
               </a:ext>
             </a:extLst>
           </p:cNvPr>
@@ -5041,116 +5137,27 @@
             <p:ph type="ftr" sz="quarter" idx="3"/>
           </p:nvPr>
         </p:nvSpPr>
-        <p:spPr/>
+        <p:spPr>
+          <a:xfrm>
+            <a:off x="3719736" y="6356350"/>
+            <a:ext cx="4577680" cy="365125"/>
+          </a:xfrm>
+        </p:spPr>
         <p:txBody>
           <a:bodyPr/>
           <a:lstStyle/>
           <a:p>
             <a:r>
-              <a:rPr lang="de-DE" b="1"/>
+              <a:rPr lang="de-DE" b="1" dirty="0"/>
               <a:t>Team 3</a:t>
             </a:r>
             <a:br>
-              <a:rPr lang="de-DE"/>
+              <a:rPr lang="de-DE" dirty="0"/>
             </a:br>
             <a:r>
-              <a:rPr lang="de-DE"/>
-              <a:t>Gründlinger Diana, Targa Aaron, Klotz Thomas, Huber Marcel, Thalmann Matthias</a:t>
-            </a:r>
-            <a:endParaRPr lang="de-DE" dirty="0"/>
-          </a:p>
-        </p:txBody>
-      </p:sp>
-      <p:sp>
-        <p:nvSpPr>
-          <p:cNvPr id="8" name="Textfeld 7">
-            <a:extLst>
-              <a:ext uri="{FF2B5EF4-FFF2-40B4-BE49-F238E27FC236}">
-                <a16:creationId xmlns:a16="http://schemas.microsoft.com/office/drawing/2014/main" id="{81B17B7E-B1BA-4A53-92CD-D8A61A64A009}"/>
-              </a:ext>
-            </a:extLst>
-          </p:cNvPr>
-          <p:cNvSpPr txBox="1"/>
-          <p:nvPr/>
-        </p:nvSpPr>
-        <p:spPr>
-          <a:xfrm>
-            <a:off x="948880" y="1196752"/>
-            <a:ext cx="8808912" cy="3269485"/>
-          </a:xfrm>
-          <a:prstGeom prst="rect">
-            <a:avLst/>
-          </a:prstGeom>
-          <a:noFill/>
-          <a:ln>
-            <a:noFill/>
-          </a:ln>
-        </p:spPr>
-        <p:txBody>
-          <a:bodyPr wrap="square" rtlCol="0">
-            <a:spAutoFit/>
-          </a:bodyPr>
-          <a:lstStyle/>
-          <a:p>
-            <a:pPr marL="285750" indent="-285750">
-              <a:lnSpc>
-                <a:spcPct val="300000"/>
-              </a:lnSpc>
-              <a:buFont typeface="Arial" panose="020B0604020202020204" pitchFamily="34" charset="0"/>
-              <a:buChar char="•"/>
-            </a:pPr>
-            <a:r>
-              <a:rPr lang="en-US" dirty="0"/>
-              <a:t>64-bit integer</a:t>
-            </a:r>
-          </a:p>
-          <a:p>
-            <a:pPr marL="285750" indent="-285750">
-              <a:lnSpc>
-                <a:spcPct val="300000"/>
-              </a:lnSpc>
-              <a:buFont typeface="Arial" panose="020B0604020202020204" pitchFamily="34" charset="0"/>
-              <a:buChar char="•"/>
-            </a:pPr>
-            <a:r>
-              <a:rPr lang="en-US" dirty="0"/>
-              <a:t>Big endian</a:t>
-            </a:r>
-          </a:p>
-          <a:p>
-            <a:pPr marL="285750" indent="-285750">
-              <a:lnSpc>
-                <a:spcPct val="300000"/>
-              </a:lnSpc>
-              <a:buFont typeface="Arial" panose="020B0604020202020204" pitchFamily="34" charset="0"/>
-              <a:buChar char="•"/>
-            </a:pPr>
-            <a:r>
-              <a:rPr lang="en-US" dirty="0"/>
-              <a:t>Huffman encoded </a:t>
-            </a:r>
-            <a:r>
-              <a:rPr lang="en-US" dirty="0">
-                <a:sym typeface="Wingdings" panose="05000000000000000000" pitchFamily="2" charset="2"/>
-              </a:rPr>
-              <a:t> less bits for small positive values</a:t>
-            </a:r>
-          </a:p>
-          <a:p>
-            <a:pPr marL="285750" indent="-285750">
-              <a:lnSpc>
-                <a:spcPct val="300000"/>
-              </a:lnSpc>
-              <a:buFont typeface="Arial" panose="020B0604020202020204" pitchFamily="34" charset="0"/>
-              <a:buChar char="•"/>
-            </a:pPr>
-            <a:r>
-              <a:rPr lang="en-US" dirty="0">
-                <a:sym typeface="Wingdings" panose="05000000000000000000" pitchFamily="2" charset="2"/>
-              </a:rPr>
-              <a:t>Between 1-9 bytes in length</a:t>
-            </a:r>
-            <a:endParaRPr lang="en-US" dirty="0"/>
+              <a:rPr lang="de-DE" dirty="0"/>
+              <a:t>Gründlinger Diana, Huber Marcel, Klotz Thomas, Targa Aaron, Thalmann Matthias</a:t>
+            </a:r>
           </a:p>
         </p:txBody>
       </p:sp>
@@ -5247,42 +5254,6 @@
               <a:pPr/>
               <a:t>6</a:t>
             </a:fld>
-            <a:endParaRPr lang="de-DE" dirty="0"/>
-          </a:p>
-        </p:txBody>
-      </p:sp>
-      <p:sp>
-        <p:nvSpPr>
-          <p:cNvPr id="5" name="Fußzeilenplatzhalter 4">
-            <a:extLst>
-              <a:ext uri="{FF2B5EF4-FFF2-40B4-BE49-F238E27FC236}">
-                <a16:creationId xmlns:a16="http://schemas.microsoft.com/office/drawing/2014/main" id="{1DCDA91A-B704-4123-93DB-5942E1A0E406}"/>
-              </a:ext>
-            </a:extLst>
-          </p:cNvPr>
-          <p:cNvSpPr>
-            <a:spLocks noGrp="1"/>
-          </p:cNvSpPr>
-          <p:nvPr>
-            <p:ph type="ftr" sz="quarter" idx="3"/>
-          </p:nvPr>
-        </p:nvSpPr>
-        <p:spPr/>
-        <p:txBody>
-          <a:bodyPr/>
-          <a:lstStyle/>
-          <a:p>
-            <a:r>
-              <a:rPr lang="de-DE" b="1"/>
-              <a:t>Team 3</a:t>
-            </a:r>
-            <a:br>
-              <a:rPr lang="de-DE"/>
-            </a:br>
-            <a:r>
-              <a:rPr lang="de-DE"/>
-              <a:t>Gründlinger Diana, Targa Aaron, Klotz Thomas, Huber Marcel, Thalmann Matthias</a:t>
-            </a:r>
             <a:endParaRPr lang="de-DE" dirty="0"/>
           </a:p>
         </p:txBody>
@@ -6390,8 +6361,8 @@
           </a:p>
         </p:txBody>
       </p:sp>
-      <mc:AlternateContent xmlns:mc="http://schemas.openxmlformats.org/markup-compatibility/2006">
-        <mc:Choice xmlns:a14="http://schemas.microsoft.com/office/drawing/2010/main" Requires="a14">
+      <mc:AlternateContent xmlns:mc="http://schemas.openxmlformats.org/markup-compatibility/2006" xmlns:a14="http://schemas.microsoft.com/office/drawing/2010/main">
+        <mc:Choice Requires="a14">
           <p:sp>
             <p:nvSpPr>
               <p:cNvPr id="78" name="Textfeld 77">
@@ -6420,6 +6391,7 @@
               </a:bodyPr>
               <a:lstStyle/>
               <a:p>
+                <a:pPr/>
                 <a14:m>
                   <m:oMathPara xmlns:m="http://schemas.openxmlformats.org/officeDocument/2006/math">
                     <m:oMathParaPr>
@@ -6465,7 +6437,7 @@
             </p:txBody>
           </p:sp>
         </mc:Choice>
-        <mc:Fallback>
+        <mc:Fallback xmlns="">
           <p:sp>
             <p:nvSpPr>
               <p:cNvPr id="78" name="Textfeld 77">
@@ -6549,6 +6521,46 @@
           </a:fontRef>
         </p:style>
       </p:cxnSp>
+      <p:sp>
+        <p:nvSpPr>
+          <p:cNvPr id="21" name="Fußzeilenplatzhalter 4">
+            <a:extLst>
+              <a:ext uri="{FF2B5EF4-FFF2-40B4-BE49-F238E27FC236}">
+                <a16:creationId xmlns:a16="http://schemas.microsoft.com/office/drawing/2014/main" id="{839D52CF-E591-49DF-9211-B45586ED1B37}"/>
+              </a:ext>
+            </a:extLst>
+          </p:cNvPr>
+          <p:cNvSpPr>
+            <a:spLocks noGrp="1"/>
+          </p:cNvSpPr>
+          <p:nvPr>
+            <p:ph type="ftr" sz="quarter" idx="3"/>
+          </p:nvPr>
+        </p:nvSpPr>
+        <p:spPr>
+          <a:xfrm>
+            <a:off x="3719736" y="6356350"/>
+            <a:ext cx="4577680" cy="365125"/>
+          </a:xfrm>
+        </p:spPr>
+        <p:txBody>
+          <a:bodyPr/>
+          <a:lstStyle/>
+          <a:p>
+            <a:r>
+              <a:rPr lang="de-DE" b="1" dirty="0"/>
+              <a:t>Team 3</a:t>
+            </a:r>
+            <a:br>
+              <a:rPr lang="de-DE" dirty="0"/>
+            </a:br>
+            <a:r>
+              <a:rPr lang="de-DE" dirty="0"/>
+              <a:t>Gründlinger Diana, Huber Marcel, Klotz Thomas, Targa Aaron, Thalmann Matthias</a:t>
+            </a:r>
+          </a:p>
+        </p:txBody>
+      </p:sp>
     </p:spTree>
     <p:extLst>
       <p:ext uri="{BB962C8B-B14F-4D97-AF65-F5344CB8AC3E}">
@@ -6642,42 +6654,6 @@
               <a:pPr/>
               <a:t>7</a:t>
             </a:fld>
-            <a:endParaRPr lang="de-DE" dirty="0"/>
-          </a:p>
-        </p:txBody>
-      </p:sp>
-      <p:sp>
-        <p:nvSpPr>
-          <p:cNvPr id="5" name="Fußzeilenplatzhalter 4">
-            <a:extLst>
-              <a:ext uri="{FF2B5EF4-FFF2-40B4-BE49-F238E27FC236}">
-                <a16:creationId xmlns:a16="http://schemas.microsoft.com/office/drawing/2014/main" id="{1DCDA91A-B704-4123-93DB-5942E1A0E406}"/>
-              </a:ext>
-            </a:extLst>
-          </p:cNvPr>
-          <p:cNvSpPr>
-            <a:spLocks noGrp="1"/>
-          </p:cNvSpPr>
-          <p:nvPr>
-            <p:ph type="ftr" sz="quarter" idx="3"/>
-          </p:nvPr>
-        </p:nvSpPr>
-        <p:spPr/>
-        <p:txBody>
-          <a:bodyPr/>
-          <a:lstStyle/>
-          <a:p>
-            <a:r>
-              <a:rPr lang="de-DE" b="1"/>
-              <a:t>Team 3</a:t>
-            </a:r>
-            <a:br>
-              <a:rPr lang="de-DE"/>
-            </a:br>
-            <a:r>
-              <a:rPr lang="de-DE"/>
-              <a:t>Gründlinger Diana, Targa Aaron, Klotz Thomas, Huber Marcel, Thalmann Matthias</a:t>
-            </a:r>
             <a:endParaRPr lang="de-DE" dirty="0"/>
           </a:p>
         </p:txBody>
@@ -7797,6 +7773,46 @@
           </a:graphicData>
         </a:graphic>
       </p:graphicFrame>
+      <p:sp>
+        <p:nvSpPr>
+          <p:cNvPr id="16" name="Fußzeilenplatzhalter 4">
+            <a:extLst>
+              <a:ext uri="{FF2B5EF4-FFF2-40B4-BE49-F238E27FC236}">
+                <a16:creationId xmlns:a16="http://schemas.microsoft.com/office/drawing/2014/main" id="{091E2A28-E5FF-4DB1-8A15-957229BF2B35}"/>
+              </a:ext>
+            </a:extLst>
+          </p:cNvPr>
+          <p:cNvSpPr>
+            <a:spLocks noGrp="1"/>
+          </p:cNvSpPr>
+          <p:nvPr>
+            <p:ph type="ftr" sz="quarter" idx="3"/>
+          </p:nvPr>
+        </p:nvSpPr>
+        <p:spPr>
+          <a:xfrm>
+            <a:off x="3719736" y="6356350"/>
+            <a:ext cx="4577680" cy="365125"/>
+          </a:xfrm>
+        </p:spPr>
+        <p:txBody>
+          <a:bodyPr/>
+          <a:lstStyle/>
+          <a:p>
+            <a:r>
+              <a:rPr lang="de-DE" b="1" dirty="0"/>
+              <a:t>Team 3</a:t>
+            </a:r>
+            <a:br>
+              <a:rPr lang="de-DE" dirty="0"/>
+            </a:br>
+            <a:r>
+              <a:rPr lang="de-DE" dirty="0"/>
+              <a:t>Gründlinger Diana, Huber Marcel, Klotz Thomas, Targa Aaron, Thalmann Matthias</a:t>
+            </a:r>
+          </a:p>
+        </p:txBody>
+      </p:sp>
     </p:spTree>
     <p:extLst>
       <p:ext uri="{BB962C8B-B14F-4D97-AF65-F5344CB8AC3E}">
@@ -7896,10 +7912,129 @@
       </p:sp>
       <p:sp>
         <p:nvSpPr>
-          <p:cNvPr id="5" name="Fußzeilenplatzhalter 4">
+          <p:cNvPr id="6" name="Textfeld 5">
             <a:extLst>
               <a:ext uri="{FF2B5EF4-FFF2-40B4-BE49-F238E27FC236}">
-                <a16:creationId xmlns:a16="http://schemas.microsoft.com/office/drawing/2014/main" id="{1DCDA91A-B704-4123-93DB-5942E1A0E406}"/>
+                <a16:creationId xmlns:a16="http://schemas.microsoft.com/office/drawing/2014/main" id="{6E9C044E-D5A9-4F9F-9EBC-7DB9E75FD001}"/>
+              </a:ext>
+            </a:extLst>
+          </p:cNvPr>
+          <p:cNvSpPr txBox="1"/>
+          <p:nvPr/>
+        </p:nvSpPr>
+        <p:spPr>
+          <a:xfrm>
+            <a:off x="959496" y="1340768"/>
+            <a:ext cx="8808912" cy="2990691"/>
+          </a:xfrm>
+          <a:prstGeom prst="rect">
+            <a:avLst/>
+          </a:prstGeom>
+          <a:noFill/>
+          <a:ln>
+            <a:noFill/>
+          </a:ln>
+        </p:spPr>
+        <p:txBody>
+          <a:bodyPr wrap="square" rtlCol="0">
+            <a:spAutoFit/>
+          </a:bodyPr>
+          <a:lstStyle/>
+          <a:p>
+            <a:pPr marL="285750" indent="-285750">
+              <a:lnSpc>
+                <a:spcPct val="300000"/>
+              </a:lnSpc>
+              <a:buFont typeface="Arial" panose="020B0604020202020204" pitchFamily="34" charset="0"/>
+              <a:buChar char="•"/>
+            </a:pPr>
+            <a:r>
+              <a:rPr lang="en-US" b="1" dirty="0"/>
+              <a:t>int</a:t>
+            </a:r>
+            <a:r>
+              <a:rPr lang="en-US" dirty="0"/>
+              <a:t> </a:t>
+            </a:r>
+            <a:r>
+              <a:rPr lang="en-US" dirty="0">
+                <a:sym typeface="Wingdings" panose="05000000000000000000" pitchFamily="2" charset="2"/>
+              </a:rPr>
+              <a:t> one of the integer types (serial type 1-6)</a:t>
+            </a:r>
+          </a:p>
+          <a:p>
+            <a:pPr marL="742950" lvl="1" indent="-285750">
+              <a:lnSpc>
+                <a:spcPct val="200000"/>
+              </a:lnSpc>
+              <a:buFont typeface="Arial" panose="020B0604020202020204" pitchFamily="34" charset="0"/>
+              <a:buChar char="•"/>
+            </a:pPr>
+            <a:r>
+              <a:rPr lang="en-US" dirty="0">
+                <a:sym typeface="Wingdings" panose="05000000000000000000" pitchFamily="2" charset="2"/>
+              </a:rPr>
+              <a:t> if the value is 0 or 1, serial codes 8/9 are used</a:t>
+            </a:r>
+            <a:endParaRPr lang="en-US" dirty="0"/>
+          </a:p>
+          <a:p>
+            <a:pPr marL="285750" indent="-285750">
+              <a:lnSpc>
+                <a:spcPct val="300000"/>
+              </a:lnSpc>
+              <a:buFont typeface="Arial" panose="020B0604020202020204" pitchFamily="34" charset="0"/>
+              <a:buChar char="•"/>
+            </a:pPr>
+            <a:r>
+              <a:rPr lang="en-US" b="1" dirty="0"/>
+              <a:t>float</a:t>
+            </a:r>
+            <a:r>
+              <a:rPr lang="en-US" dirty="0"/>
+              <a:t> </a:t>
+            </a:r>
+            <a:r>
+              <a:rPr lang="en-US" dirty="0">
+                <a:sym typeface="Wingdings" panose="05000000000000000000" pitchFamily="2" charset="2"/>
+              </a:rPr>
+              <a:t> serial type 7</a:t>
+            </a:r>
+            <a:endParaRPr lang="en-US" dirty="0"/>
+          </a:p>
+          <a:p>
+            <a:pPr marL="285750" indent="-285750">
+              <a:lnSpc>
+                <a:spcPct val="300000"/>
+              </a:lnSpc>
+              <a:buFont typeface="Arial" panose="020B0604020202020204" pitchFamily="34" charset="0"/>
+              <a:buChar char="•"/>
+            </a:pPr>
+            <a:r>
+              <a:rPr lang="en-US" b="1" dirty="0"/>
+              <a:t>varchar</a:t>
+            </a:r>
+            <a:r>
+              <a:rPr lang="en-US" dirty="0"/>
+              <a:t> </a:t>
+            </a:r>
+            <a:r>
+              <a:rPr lang="en-US" dirty="0">
+                <a:sym typeface="Wingdings" panose="05000000000000000000" pitchFamily="2" charset="2"/>
+              </a:rPr>
+              <a:t> string (serial type ≥ 13 and odd)</a:t>
+            </a:r>
+            <a:endParaRPr lang="en-US" dirty="0"/>
+          </a:p>
+        </p:txBody>
+      </p:sp>
+      <p:sp>
+        <p:nvSpPr>
+          <p:cNvPr id="7" name="Fußzeilenplatzhalter 4">
+            <a:extLst>
+              <a:ext uri="{FF2B5EF4-FFF2-40B4-BE49-F238E27FC236}">
+                <a16:creationId xmlns:a16="http://schemas.microsoft.com/office/drawing/2014/main" id="{36B2B1C8-D2B9-4A61-BC22-1FFA595DD0FB}"/>
               </a:ext>
             </a:extLst>
           </p:cNvPr>
@@ -7910,142 +8045,27 @@
             <p:ph type="ftr" sz="quarter" idx="3"/>
           </p:nvPr>
         </p:nvSpPr>
-        <p:spPr/>
+        <p:spPr>
+          <a:xfrm>
+            <a:off x="3719736" y="6356350"/>
+            <a:ext cx="4577680" cy="365125"/>
+          </a:xfrm>
+        </p:spPr>
         <p:txBody>
           <a:bodyPr/>
           <a:lstStyle/>
           <a:p>
             <a:r>
-              <a:rPr lang="de-DE" b="1"/>
+              <a:rPr lang="de-DE" b="1" dirty="0"/>
               <a:t>Team 3</a:t>
             </a:r>
             <a:br>
-              <a:rPr lang="de-DE"/>
+              <a:rPr lang="de-DE" dirty="0"/>
             </a:br>
             <a:r>
-              <a:rPr lang="de-DE"/>
-              <a:t>Gründlinger Diana, Targa Aaron, Klotz Thomas, Huber Marcel, Thalmann Matthias</a:t>
-            </a:r>
-            <a:endParaRPr lang="de-DE" dirty="0"/>
-          </a:p>
-        </p:txBody>
-      </p:sp>
-      <p:sp>
-        <p:nvSpPr>
-          <p:cNvPr id="6" name="Textfeld 5">
-            <a:extLst>
-              <a:ext uri="{FF2B5EF4-FFF2-40B4-BE49-F238E27FC236}">
-                <a16:creationId xmlns:a16="http://schemas.microsoft.com/office/drawing/2014/main" id="{6E9C044E-D5A9-4F9F-9EBC-7DB9E75FD001}"/>
-              </a:ext>
-            </a:extLst>
-          </p:cNvPr>
-          <p:cNvSpPr txBox="1"/>
-          <p:nvPr/>
-        </p:nvSpPr>
-        <p:spPr>
-          <a:xfrm>
-            <a:off x="959496" y="1340768"/>
-            <a:ext cx="8808912" cy="2990691"/>
-          </a:xfrm>
-          <a:prstGeom prst="rect">
-            <a:avLst/>
-          </a:prstGeom>
-          <a:noFill/>
-          <a:ln>
-            <a:noFill/>
-          </a:ln>
-        </p:spPr>
-        <p:txBody>
-          <a:bodyPr wrap="square" rtlCol="0">
-            <a:spAutoFit/>
-          </a:bodyPr>
-          <a:lstStyle/>
-          <a:p>
-            <a:pPr marL="285750" indent="-285750">
-              <a:lnSpc>
-                <a:spcPct val="300000"/>
-              </a:lnSpc>
-              <a:buFont typeface="Arial" panose="020B0604020202020204" pitchFamily="34" charset="0"/>
-              <a:buChar char="•"/>
-            </a:pPr>
-            <a:r>
-              <a:rPr lang="en-US" b="1" dirty="0"/>
-              <a:t>int</a:t>
-            </a:r>
-            <a:r>
-              <a:rPr lang="en-US" dirty="0"/>
-              <a:t> </a:t>
-            </a:r>
-            <a:r>
-              <a:rPr lang="en-US" dirty="0">
-                <a:sym typeface="Wingdings" panose="05000000000000000000" pitchFamily="2" charset="2"/>
-              </a:rPr>
-              <a:t> one of the integer types (serial type 1-6)</a:t>
-            </a:r>
-          </a:p>
-          <a:p>
-            <a:pPr marL="742950" lvl="1" indent="-285750">
-              <a:lnSpc>
-                <a:spcPct val="200000"/>
-              </a:lnSpc>
-              <a:buFont typeface="Arial" panose="020B0604020202020204" pitchFamily="34" charset="0"/>
-              <a:buChar char="•"/>
-            </a:pPr>
-            <a:r>
-              <a:rPr lang="en-US" dirty="0">
-                <a:sym typeface="Wingdings" panose="05000000000000000000" pitchFamily="2" charset="2"/>
-              </a:rPr>
-              <a:t> if the value is 0 or 1, serial codes 8/9 are used</a:t>
-            </a:r>
-            <a:endParaRPr lang="en-US" dirty="0"/>
-          </a:p>
-          <a:p>
-            <a:pPr marL="285750" indent="-285750">
-              <a:lnSpc>
-                <a:spcPct val="300000"/>
-              </a:lnSpc>
-              <a:buFont typeface="Arial" panose="020B0604020202020204" pitchFamily="34" charset="0"/>
-              <a:buChar char="•"/>
-            </a:pPr>
-            <a:r>
-              <a:rPr lang="en-US" b="1" dirty="0"/>
-              <a:t>float</a:t>
-            </a:r>
-            <a:r>
-              <a:rPr lang="en-US" dirty="0"/>
-              <a:t> </a:t>
-            </a:r>
-            <a:r>
-              <a:rPr lang="en-US" dirty="0">
-                <a:sym typeface="Wingdings" panose="05000000000000000000" pitchFamily="2" charset="2"/>
-              </a:rPr>
-              <a:t> serial type 7</a:t>
-            </a:r>
-            <a:endParaRPr lang="en-US" dirty="0"/>
-          </a:p>
-          <a:p>
-            <a:pPr marL="285750" indent="-285750">
-              <a:lnSpc>
-                <a:spcPct val="300000"/>
-              </a:lnSpc>
-              <a:buFont typeface="Arial" panose="020B0604020202020204" pitchFamily="34" charset="0"/>
-              <a:buChar char="•"/>
-            </a:pPr>
-            <a:r>
-              <a:rPr lang="en-US" b="1" dirty="0"/>
-              <a:t>varchar</a:t>
-            </a:r>
-            <a:r>
-              <a:rPr lang="en-US" dirty="0"/>
-              <a:t> </a:t>
-            </a:r>
-            <a:r>
-              <a:rPr lang="en-US" dirty="0">
-                <a:sym typeface="Wingdings" panose="05000000000000000000" pitchFamily="2" charset="2"/>
-              </a:rPr>
-              <a:t> string (serial type ≥ 13 and odd)</a:t>
-            </a:r>
-            <a:endParaRPr lang="en-US" dirty="0"/>
+              <a:rPr lang="de-DE" dirty="0"/>
+              <a:t>Gründlinger Diana, Huber Marcel, Klotz Thomas, Targa Aaron, Thalmann Matthias</a:t>
+            </a:r>
           </a:p>
         </p:txBody>
       </p:sp>

</xml_diff>